<commit_message>
Add sound Id list
</commit_message>
<xml_diff>
--- a/assets/media/thumbnail/template.pptx
+++ b/assets/media/thumbnail/template.pptx
@@ -5,7 +5,7 @@
     <p:sldMasterId id="2147483660" r:id="rId1"/>
   </p:sldMasterIdLst>
   <p:notesMasterIdLst>
-    <p:notesMasterId r:id="rId98"/>
+    <p:notesMasterId r:id="rId99"/>
   </p:notesMasterIdLst>
   <p:sldIdLst>
     <p:sldId id="259" r:id="rId2"/>
@@ -94,16 +94,17 @@
     <p:sldId id="348" r:id="rId85"/>
     <p:sldId id="343" r:id="rId86"/>
     <p:sldId id="344" r:id="rId87"/>
-    <p:sldId id="346" r:id="rId88"/>
-    <p:sldId id="347" r:id="rId89"/>
-    <p:sldId id="351" r:id="rId90"/>
-    <p:sldId id="352" r:id="rId91"/>
-    <p:sldId id="353" r:id="rId92"/>
-    <p:sldId id="354" r:id="rId93"/>
-    <p:sldId id="355" r:id="rId94"/>
-    <p:sldId id="349" r:id="rId95"/>
-    <p:sldId id="350" r:id="rId96"/>
-    <p:sldId id="332" r:id="rId97"/>
+    <p:sldId id="356" r:id="rId88"/>
+    <p:sldId id="346" r:id="rId89"/>
+    <p:sldId id="347" r:id="rId90"/>
+    <p:sldId id="351" r:id="rId91"/>
+    <p:sldId id="352" r:id="rId92"/>
+    <p:sldId id="353" r:id="rId93"/>
+    <p:sldId id="354" r:id="rId94"/>
+    <p:sldId id="355" r:id="rId95"/>
+    <p:sldId id="349" r:id="rId96"/>
+    <p:sldId id="350" r:id="rId97"/>
+    <p:sldId id="332" r:id="rId98"/>
   </p:sldIdLst>
   <p:sldSz cx="9144000" cy="5143500" type="screen16x9"/>
   <p:notesSz cx="6858000" cy="9144000"/>
@@ -297,6 +298,7 @@
             <p14:sldId id="348"/>
             <p14:sldId id="343"/>
             <p14:sldId id="344"/>
+            <p14:sldId id="356"/>
             <p14:sldId id="346"/>
             <p14:sldId id="347"/>
           </p14:sldIdLst>
@@ -428,7 +430,7 @@
           <a:p>
             <a:fld id="{DAF7419A-5719-4DB0-801F-AE25AB2C4835}" type="datetimeFigureOut">
               <a:rPr lang="en-US" smtClean="0"/>
-              <a:t>4/7/2022</a:t>
+              <a:t>4/10/2022</a:t>
             </a:fld>
             <a:endParaRPr lang="en-US" dirty="0"/>
           </a:p>
@@ -8167,7 +8169,7 @@
     </p:spTree>
     <p:extLst>
       <p:ext uri="{BB962C8B-B14F-4D97-AF65-F5344CB8AC3E}">
-        <p14:creationId xmlns:p14="http://schemas.microsoft.com/office/powerpoint/2010/main" val="927399378"/>
+        <p14:creationId xmlns:p14="http://schemas.microsoft.com/office/powerpoint/2010/main" val="3497460052"/>
       </p:ext>
     </p:extLst>
   </p:cSld>
@@ -8254,7 +8256,7 @@
     </p:spTree>
     <p:extLst>
       <p:ext uri="{BB962C8B-B14F-4D97-AF65-F5344CB8AC3E}">
-        <p14:creationId xmlns:p14="http://schemas.microsoft.com/office/powerpoint/2010/main" val="3603436678"/>
+        <p14:creationId xmlns:p14="http://schemas.microsoft.com/office/powerpoint/2010/main" val="927399378"/>
       </p:ext>
     </p:extLst>
   </p:cSld>
@@ -8308,7 +8310,10 @@
           <a:bodyPr/>
           <a:lstStyle/>
           <a:p>
-            <a:endParaRPr lang="vi-VN" dirty="0"/>
+            <a:r>
+              <a:rPr lang="vi-VN" dirty="0"/>
+              <a:t>/?</a:t>
+            </a:r>
           </a:p>
         </p:txBody>
       </p:sp>
@@ -8338,7 +8343,7 @@
     </p:spTree>
     <p:extLst>
       <p:ext uri="{BB962C8B-B14F-4D97-AF65-F5344CB8AC3E}">
-        <p14:creationId xmlns:p14="http://schemas.microsoft.com/office/powerpoint/2010/main" val="1580828146"/>
+        <p14:creationId xmlns:p14="http://schemas.microsoft.com/office/powerpoint/2010/main" val="3603436678"/>
       </p:ext>
     </p:extLst>
   </p:cSld>
@@ -8509,7 +8514,7 @@
     </p:spTree>
     <p:extLst>
       <p:ext uri="{BB962C8B-B14F-4D97-AF65-F5344CB8AC3E}">
-        <p14:creationId xmlns:p14="http://schemas.microsoft.com/office/powerpoint/2010/main" val="880678517"/>
+        <p14:creationId xmlns:p14="http://schemas.microsoft.com/office/powerpoint/2010/main" val="1580828146"/>
       </p:ext>
     </p:extLst>
   </p:cSld>
@@ -8593,7 +8598,7 @@
     </p:spTree>
     <p:extLst>
       <p:ext uri="{BB962C8B-B14F-4D97-AF65-F5344CB8AC3E}">
-        <p14:creationId xmlns:p14="http://schemas.microsoft.com/office/powerpoint/2010/main" val="3795521162"/>
+        <p14:creationId xmlns:p14="http://schemas.microsoft.com/office/powerpoint/2010/main" val="880678517"/>
       </p:ext>
     </p:extLst>
   </p:cSld>
@@ -8677,7 +8682,7 @@
     </p:spTree>
     <p:extLst>
       <p:ext uri="{BB962C8B-B14F-4D97-AF65-F5344CB8AC3E}">
-        <p14:creationId xmlns:p14="http://schemas.microsoft.com/office/powerpoint/2010/main" val="232954569"/>
+        <p14:creationId xmlns:p14="http://schemas.microsoft.com/office/powerpoint/2010/main" val="3795521162"/>
       </p:ext>
     </p:extLst>
   </p:cSld>
@@ -8761,7 +8766,7 @@
     </p:spTree>
     <p:extLst>
       <p:ext uri="{BB962C8B-B14F-4D97-AF65-F5344CB8AC3E}">
-        <p14:creationId xmlns:p14="http://schemas.microsoft.com/office/powerpoint/2010/main" val="3301698305"/>
+        <p14:creationId xmlns:p14="http://schemas.microsoft.com/office/powerpoint/2010/main" val="232954569"/>
       </p:ext>
     </p:extLst>
   </p:cSld>
@@ -8845,7 +8850,7 @@
     </p:spTree>
     <p:extLst>
       <p:ext uri="{BB962C8B-B14F-4D97-AF65-F5344CB8AC3E}">
-        <p14:creationId xmlns:p14="http://schemas.microsoft.com/office/powerpoint/2010/main" val="418430412"/>
+        <p14:creationId xmlns:p14="http://schemas.microsoft.com/office/powerpoint/2010/main" val="3301698305"/>
       </p:ext>
     </p:extLst>
   </p:cSld>
@@ -8929,7 +8934,7 @@
     </p:spTree>
     <p:extLst>
       <p:ext uri="{BB962C8B-B14F-4D97-AF65-F5344CB8AC3E}">
-        <p14:creationId xmlns:p14="http://schemas.microsoft.com/office/powerpoint/2010/main" val="2087517936"/>
+        <p14:creationId xmlns:p14="http://schemas.microsoft.com/office/powerpoint/2010/main" val="418430412"/>
       </p:ext>
     </p:extLst>
   </p:cSld>
@@ -9005,6 +9010,90 @@
             <a:fld id="{BF1434EF-918F-4A4D-98D1-563F3F7CA387}" type="slidenum">
               <a:rPr lang="en-US" smtClean="0"/>
               <a:t>96</a:t>
+            </a:fld>
+            <a:endParaRPr lang="en-US" dirty="0"/>
+          </a:p>
+        </p:txBody>
+      </p:sp>
+    </p:spTree>
+    <p:extLst>
+      <p:ext uri="{BB962C8B-B14F-4D97-AF65-F5344CB8AC3E}">
+        <p14:creationId xmlns:p14="http://schemas.microsoft.com/office/powerpoint/2010/main" val="2087517936"/>
+      </p:ext>
+    </p:extLst>
+  </p:cSld>
+  <p:clrMapOvr>
+    <a:masterClrMapping/>
+  </p:clrMapOvr>
+</p:notes>
+</file>
+
+<file path=ppt/notesSlides/notesSlide97.xml><?xml version="1.0" encoding="utf-8"?>
+<p:notes xmlns:a="http://schemas.openxmlformats.org/drawingml/2006/main" xmlns:r="http://schemas.openxmlformats.org/officeDocument/2006/relationships" xmlns:p="http://schemas.openxmlformats.org/presentationml/2006/main">
+  <p:cSld>
+    <p:spTree>
+      <p:nvGrpSpPr>
+        <p:cNvPr id="1" name=""/>
+        <p:cNvGrpSpPr/>
+        <p:nvPr/>
+      </p:nvGrpSpPr>
+      <p:grpSpPr>
+        <a:xfrm>
+          <a:off x="0" y="0"/>
+          <a:ext cx="0" cy="0"/>
+          <a:chOff x="0" y="0"/>
+          <a:chExt cx="0" cy="0"/>
+        </a:xfrm>
+      </p:grpSpPr>
+      <p:sp>
+        <p:nvSpPr>
+          <p:cNvPr id="2" name="Slide Image Placeholder 1"/>
+          <p:cNvSpPr>
+            <a:spLocks noGrp="1" noRot="1" noChangeAspect="1"/>
+          </p:cNvSpPr>
+          <p:nvPr>
+            <p:ph type="sldImg"/>
+          </p:nvPr>
+        </p:nvSpPr>
+        <p:spPr/>
+      </p:sp>
+      <p:sp>
+        <p:nvSpPr>
+          <p:cNvPr id="3" name="Notes Placeholder 2"/>
+          <p:cNvSpPr>
+            <a:spLocks noGrp="1"/>
+          </p:cNvSpPr>
+          <p:nvPr>
+            <p:ph type="body" idx="1"/>
+          </p:nvPr>
+        </p:nvSpPr>
+        <p:spPr/>
+        <p:txBody>
+          <a:bodyPr/>
+          <a:lstStyle/>
+          <a:p>
+            <a:endParaRPr lang="vi-VN" dirty="0"/>
+          </a:p>
+        </p:txBody>
+      </p:sp>
+      <p:sp>
+        <p:nvSpPr>
+          <p:cNvPr id="4" name="Slide Number Placeholder 3"/>
+          <p:cNvSpPr>
+            <a:spLocks noGrp="1"/>
+          </p:cNvSpPr>
+          <p:nvPr>
+            <p:ph type="sldNum" sz="quarter" idx="5"/>
+          </p:nvPr>
+        </p:nvSpPr>
+        <p:spPr/>
+        <p:txBody>
+          <a:bodyPr/>
+          <a:lstStyle/>
+          <a:p>
+            <a:fld id="{BF1434EF-918F-4A4D-98D1-563F3F7CA387}" type="slidenum">
+              <a:rPr lang="en-US" smtClean="0"/>
+              <a:t>97</a:t>
             </a:fld>
             <a:endParaRPr lang="en-US" dirty="0"/>
           </a:p>
@@ -9154,7 +9243,7 @@
           <a:p>
             <a:fld id="{6BAADE55-1DD3-44E1-A8C2-24E0E03344A6}" type="datetimeFigureOut">
               <a:rPr lang="en-US" smtClean="0"/>
-              <a:t>4/7/2022</a:t>
+              <a:t>4/10/2022</a:t>
             </a:fld>
             <a:endParaRPr lang="en-US" dirty="0"/>
           </a:p>
@@ -9324,7 +9413,7 @@
           <a:p>
             <a:fld id="{6BAADE55-1DD3-44E1-A8C2-24E0E03344A6}" type="datetimeFigureOut">
               <a:rPr lang="en-US" smtClean="0"/>
-              <a:t>4/7/2022</a:t>
+              <a:t>4/10/2022</a:t>
             </a:fld>
             <a:endParaRPr lang="en-US" dirty="0"/>
           </a:p>
@@ -9504,7 +9593,7 @@
           <a:p>
             <a:fld id="{6BAADE55-1DD3-44E1-A8C2-24E0E03344A6}" type="datetimeFigureOut">
               <a:rPr lang="en-US" smtClean="0"/>
-              <a:t>4/7/2022</a:t>
+              <a:t>4/10/2022</a:t>
             </a:fld>
             <a:endParaRPr lang="en-US" dirty="0"/>
           </a:p>
@@ -9674,7 +9763,7 @@
           <a:p>
             <a:fld id="{6BAADE55-1DD3-44E1-A8C2-24E0E03344A6}" type="datetimeFigureOut">
               <a:rPr lang="en-US" smtClean="0"/>
-              <a:t>4/7/2022</a:t>
+              <a:t>4/10/2022</a:t>
             </a:fld>
             <a:endParaRPr lang="en-US" dirty="0"/>
           </a:p>
@@ -9920,7 +10009,7 @@
           <a:p>
             <a:fld id="{6BAADE55-1DD3-44E1-A8C2-24E0E03344A6}" type="datetimeFigureOut">
               <a:rPr lang="en-US" smtClean="0"/>
-              <a:t>4/7/2022</a:t>
+              <a:t>4/10/2022</a:t>
             </a:fld>
             <a:endParaRPr lang="en-US" dirty="0"/>
           </a:p>
@@ -10152,7 +10241,7 @@
           <a:p>
             <a:fld id="{6BAADE55-1DD3-44E1-A8C2-24E0E03344A6}" type="datetimeFigureOut">
               <a:rPr lang="en-US" smtClean="0"/>
-              <a:t>4/7/2022</a:t>
+              <a:t>4/10/2022</a:t>
             </a:fld>
             <a:endParaRPr lang="en-US" dirty="0"/>
           </a:p>
@@ -10519,7 +10608,7 @@
           <a:p>
             <a:fld id="{6BAADE55-1DD3-44E1-A8C2-24E0E03344A6}" type="datetimeFigureOut">
               <a:rPr lang="en-US" smtClean="0"/>
-              <a:t>4/7/2022</a:t>
+              <a:t>4/10/2022</a:t>
             </a:fld>
             <a:endParaRPr lang="en-US" dirty="0"/>
           </a:p>
@@ -10637,7 +10726,7 @@
           <a:p>
             <a:fld id="{6BAADE55-1DD3-44E1-A8C2-24E0E03344A6}" type="datetimeFigureOut">
               <a:rPr lang="en-US" smtClean="0"/>
-              <a:t>4/7/2022</a:t>
+              <a:t>4/10/2022</a:t>
             </a:fld>
             <a:endParaRPr lang="en-US" dirty="0"/>
           </a:p>
@@ -10732,7 +10821,7 @@
           <a:p>
             <a:fld id="{6BAADE55-1DD3-44E1-A8C2-24E0E03344A6}" type="datetimeFigureOut">
               <a:rPr lang="en-US" smtClean="0"/>
-              <a:t>4/7/2022</a:t>
+              <a:t>4/10/2022</a:t>
             </a:fld>
             <a:endParaRPr lang="en-US" dirty="0"/>
           </a:p>
@@ -11009,7 +11098,7 @@
           <a:p>
             <a:fld id="{6BAADE55-1DD3-44E1-A8C2-24E0E03344A6}" type="datetimeFigureOut">
               <a:rPr lang="en-US" smtClean="0"/>
-              <a:t>4/7/2022</a:t>
+              <a:t>4/10/2022</a:t>
             </a:fld>
             <a:endParaRPr lang="en-US" dirty="0"/>
           </a:p>
@@ -11265,7 +11354,7 @@
           <a:p>
             <a:fld id="{6BAADE55-1DD3-44E1-A8C2-24E0E03344A6}" type="datetimeFigureOut">
               <a:rPr lang="en-US" smtClean="0"/>
-              <a:t>4/7/2022</a:t>
+              <a:t>4/10/2022</a:t>
             </a:fld>
             <a:endParaRPr lang="en-US" dirty="0"/>
           </a:p>
@@ -11484,7 +11573,7 @@
           <a:p>
             <a:fld id="{6BAADE55-1DD3-44E1-A8C2-24E0E03344A6}" type="datetimeFigureOut">
               <a:rPr lang="en-US" smtClean="0"/>
-              <a:t>4/7/2022</a:t>
+              <a:t>4/10/2022</a:t>
             </a:fld>
             <a:endParaRPr lang="en-US" dirty="0"/>
           </a:p>
@@ -42743,6 +42832,190 @@
         </p:nvSpPr>
         <p:spPr>
           <a:xfrm>
+            <a:off x="2459881" y="3858413"/>
+            <a:ext cx="4224233" cy="1015663"/>
+          </a:xfrm>
+          <a:prstGeom prst="rect">
+            <a:avLst/>
+          </a:prstGeom>
+          <a:noFill/>
+        </p:spPr>
+        <p:txBody>
+          <a:bodyPr wrap="none" rtlCol="0">
+            <a:spAutoFit/>
+          </a:bodyPr>
+          <a:lstStyle/>
+          <a:p>
+            <a:r>
+              <a:rPr lang="vi-VN" sz="6000">
+                <a:ln w="19050">
+                  <a:solidFill>
+                    <a:schemeClr val="tx1"/>
+                  </a:solidFill>
+                </a:ln>
+                <a:solidFill>
+                  <a:srgbClr val="FFFF00"/>
+                </a:solidFill>
+                <a:latin typeface="FVF Fernando 08" panose="02000507020000020003" pitchFamily="2" charset="0"/>
+              </a:rPr>
+              <a:t>Sound </a:t>
+            </a:r>
+            <a:r>
+              <a:rPr lang="vi-VN" sz="6000" dirty="0">
+                <a:ln w="19050">
+                  <a:solidFill>
+                    <a:schemeClr val="tx1"/>
+                  </a:solidFill>
+                </a:ln>
+                <a:solidFill>
+                  <a:srgbClr val="FFFF00"/>
+                </a:solidFill>
+                <a:latin typeface="FVF Fernando 08" panose="02000507020000020003" pitchFamily="2" charset="0"/>
+              </a:rPr>
+              <a:t>Id</a:t>
+            </a:r>
+            <a:endParaRPr lang="en-US" sz="6000" dirty="0">
+              <a:ln w="19050">
+                <a:solidFill>
+                  <a:schemeClr val="tx1"/>
+                </a:solidFill>
+              </a:ln>
+              <a:solidFill>
+                <a:srgbClr val="FFFF00"/>
+              </a:solidFill>
+              <a:latin typeface="FVF Fernando 08" panose="02000507020000020003" pitchFamily="2" charset="0"/>
+            </a:endParaRPr>
+          </a:p>
+        </p:txBody>
+      </p:sp>
+      <p:pic>
+        <p:nvPicPr>
+          <p:cNvPr id="14" name="Picture 13">
+            <a:extLst>
+              <a:ext uri="{FF2B5EF4-FFF2-40B4-BE49-F238E27FC236}">
+                <a16:creationId xmlns:a16="http://schemas.microsoft.com/office/drawing/2014/main" id="{E2D411D6-C028-4F7B-96FB-CC2855017620}"/>
+              </a:ext>
+            </a:extLst>
+          </p:cNvPr>
+          <p:cNvPicPr>
+            <a:picLocks noChangeAspect="1"/>
+          </p:cNvPicPr>
+          <p:nvPr/>
+        </p:nvPicPr>
+        <p:blipFill>
+          <a:blip r:embed="rId3">
+            <a:extLst>
+              <a:ext uri="{28A0092B-C50C-407E-A947-70E740481C1C}">
+                <a14:useLocalDpi xmlns:a14="http://schemas.microsoft.com/office/drawing/2010/main" val="0"/>
+              </a:ext>
+            </a:extLst>
+          </a:blip>
+          <a:srcRect/>
+          <a:stretch/>
+        </p:blipFill>
+        <p:spPr>
+          <a:xfrm>
+            <a:off x="7675990" y="30481"/>
+            <a:ext cx="1490870" cy="1490870"/>
+          </a:xfrm>
+          <a:prstGeom prst="rect">
+            <a:avLst/>
+          </a:prstGeom>
+          <a:ln w="19050">
+            <a:noFill/>
+          </a:ln>
+          <a:effectLst>
+            <a:outerShdw blurRad="63500" sx="104000" sy="104000" algn="ctr" rotWithShape="0">
+              <a:srgbClr val="FFFF00"/>
+            </a:outerShdw>
+          </a:effectLst>
+        </p:spPr>
+      </p:pic>
+      <p:pic>
+        <p:nvPicPr>
+          <p:cNvPr id="3" name="Picture 2">
+            <a:extLst>
+              <a:ext uri="{FF2B5EF4-FFF2-40B4-BE49-F238E27FC236}">
+                <a16:creationId xmlns:a16="http://schemas.microsoft.com/office/drawing/2014/main" id="{5BA2E600-ACA3-41D4-AE81-59539181FF36}"/>
+              </a:ext>
+            </a:extLst>
+          </p:cNvPr>
+          <p:cNvPicPr>
+            <a:picLocks noChangeAspect="1"/>
+          </p:cNvPicPr>
+          <p:nvPr/>
+        </p:nvPicPr>
+        <p:blipFill>
+          <a:blip r:embed="rId4">
+            <a:extLst>
+              <a:ext uri="{28A0092B-C50C-407E-A947-70E740481C1C}">
+                <a14:useLocalDpi xmlns:a14="http://schemas.microsoft.com/office/drawing/2010/main" val="0"/>
+              </a:ext>
+            </a:extLst>
+          </a:blip>
+          <a:stretch>
+            <a:fillRect/>
+          </a:stretch>
+        </p:blipFill>
+        <p:spPr>
+          <a:xfrm>
+            <a:off x="3025669" y="1513735"/>
+            <a:ext cx="3092659" cy="2116030"/>
+          </a:xfrm>
+          <a:prstGeom prst="rect">
+            <a:avLst/>
+          </a:prstGeom>
+          <a:effectLst>
+            <a:glow rad="63500">
+              <a:srgbClr val="FFC000"/>
+            </a:glow>
+          </a:effectLst>
+        </p:spPr>
+      </p:pic>
+    </p:spTree>
+    <p:extLst>
+      <p:ext uri="{BB962C8B-B14F-4D97-AF65-F5344CB8AC3E}">
+        <p14:creationId xmlns:p14="http://schemas.microsoft.com/office/powerpoint/2010/main" val="3275444130"/>
+      </p:ext>
+    </p:extLst>
+  </p:cSld>
+  <p:clrMapOvr>
+    <a:masterClrMapping/>
+  </p:clrMapOvr>
+</p:sld>
+</file>
+
+<file path=ppt/slides/slide88.xml><?xml version="1.0" encoding="utf-8"?>
+<p:sld xmlns:a="http://schemas.openxmlformats.org/drawingml/2006/main" xmlns:r="http://schemas.openxmlformats.org/officeDocument/2006/relationships" xmlns:p="http://schemas.openxmlformats.org/presentationml/2006/main">
+  <p:cSld>
+    <p:spTree>
+      <p:nvGrpSpPr>
+        <p:cNvPr id="1" name=""/>
+        <p:cNvGrpSpPr/>
+        <p:nvPr/>
+      </p:nvGrpSpPr>
+      <p:grpSpPr>
+        <a:xfrm>
+          <a:off x="0" y="0"/>
+          <a:ext cx="0" cy="0"/>
+          <a:chOff x="0" y="0"/>
+          <a:chExt cx="0" cy="0"/>
+        </a:xfrm>
+      </p:grpSpPr>
+      <p:sp>
+        <p:nvSpPr>
+          <p:cNvPr id="11" name="TextBox 10">
+            <a:extLst>
+              <a:ext uri="{FF2B5EF4-FFF2-40B4-BE49-F238E27FC236}">
+                <a16:creationId xmlns:a16="http://schemas.microsoft.com/office/drawing/2014/main" id="{49A7B9B6-8455-43BE-8670-E01CE03933DF}"/>
+              </a:ext>
+            </a:extLst>
+          </p:cNvPr>
+          <p:cNvSpPr txBox="1"/>
+          <p:nvPr/>
+        </p:nvSpPr>
+        <p:spPr>
+          <a:xfrm>
             <a:off x="2604151" y="3858413"/>
             <a:ext cx="3935693" cy="1015663"/>
           </a:xfrm>
@@ -42882,7 +43155,7 @@
 </p:sld>
 </file>
 
-<file path=ppt/slides/slide88.xml><?xml version="1.0" encoding="utf-8"?>
+<file path=ppt/slides/slide89.xml><?xml version="1.0" encoding="utf-8"?>
 <p:sld xmlns:a="http://schemas.openxmlformats.org/drawingml/2006/main" xmlns:r="http://schemas.openxmlformats.org/officeDocument/2006/relationships" xmlns:p="http://schemas.openxmlformats.org/presentationml/2006/main">
   <p:cSld>
     <p:spTree>
@@ -43052,7 +43325,287 @@
 </p:sld>
 </file>
 
-<file path=ppt/slides/slide89.xml><?xml version="1.0" encoding="utf-8"?>
+<file path=ppt/slides/slide9.xml><?xml version="1.0" encoding="utf-8"?>
+<p:sld xmlns:a="http://schemas.openxmlformats.org/drawingml/2006/main" xmlns:r="http://schemas.openxmlformats.org/officeDocument/2006/relationships" xmlns:p="http://schemas.openxmlformats.org/presentationml/2006/main">
+  <p:cSld>
+    <p:spTree>
+      <p:nvGrpSpPr>
+        <p:cNvPr id="1" name=""/>
+        <p:cNvGrpSpPr/>
+        <p:nvPr/>
+      </p:nvGrpSpPr>
+      <p:grpSpPr>
+        <a:xfrm>
+          <a:off x="0" y="0"/>
+          <a:ext cx="0" cy="0"/>
+          <a:chOff x="0" y="0"/>
+          <a:chExt cx="0" cy="0"/>
+        </a:xfrm>
+      </p:grpSpPr>
+      <p:sp>
+        <p:nvSpPr>
+          <p:cNvPr id="11" name="TextBox 10">
+            <a:extLst>
+              <a:ext uri="{FF2B5EF4-FFF2-40B4-BE49-F238E27FC236}">
+                <a16:creationId xmlns:a16="http://schemas.microsoft.com/office/drawing/2014/main" id="{49A7B9B6-8455-43BE-8670-E01CE03933DF}"/>
+              </a:ext>
+            </a:extLst>
+          </p:cNvPr>
+          <p:cNvSpPr txBox="1"/>
+          <p:nvPr/>
+        </p:nvSpPr>
+        <p:spPr>
+          <a:xfrm>
+            <a:off x="2171343" y="3858413"/>
+            <a:ext cx="4801314" cy="1015663"/>
+          </a:xfrm>
+          <a:prstGeom prst="rect">
+            <a:avLst/>
+          </a:prstGeom>
+          <a:noFill/>
+        </p:spPr>
+        <p:txBody>
+          <a:bodyPr wrap="none" rtlCol="0">
+            <a:spAutoFit/>
+          </a:bodyPr>
+          <a:lstStyle/>
+          <a:p>
+            <a:r>
+              <a:rPr lang="vi-VN" sz="6000" dirty="0">
+                <a:ln w="19050">
+                  <a:solidFill>
+                    <a:schemeClr val="tx1"/>
+                  </a:solidFill>
+                </a:ln>
+                <a:solidFill>
+                  <a:srgbClr val="FFFF00"/>
+                </a:solidFill>
+                <a:latin typeface="FVF Fernando 08" panose="02000507020000020003" pitchFamily="2" charset="0"/>
+              </a:rPr>
+              <a:t>/damage</a:t>
+            </a:r>
+            <a:endParaRPr lang="en-US" sz="6000" dirty="0">
+              <a:ln w="19050">
+                <a:solidFill>
+                  <a:schemeClr val="tx1"/>
+                </a:solidFill>
+              </a:ln>
+              <a:solidFill>
+                <a:srgbClr val="FFFF00"/>
+              </a:solidFill>
+              <a:latin typeface="FVF Fernando 08" panose="02000507020000020003" pitchFamily="2" charset="0"/>
+            </a:endParaRPr>
+          </a:p>
+        </p:txBody>
+      </p:sp>
+      <p:pic>
+        <p:nvPicPr>
+          <p:cNvPr id="14" name="Picture 13">
+            <a:extLst>
+              <a:ext uri="{FF2B5EF4-FFF2-40B4-BE49-F238E27FC236}">
+                <a16:creationId xmlns:a16="http://schemas.microsoft.com/office/drawing/2014/main" id="{E2D411D6-C028-4F7B-96FB-CC2855017620}"/>
+              </a:ext>
+            </a:extLst>
+          </p:cNvPr>
+          <p:cNvPicPr>
+            <a:picLocks noChangeAspect="1"/>
+          </p:cNvPicPr>
+          <p:nvPr/>
+        </p:nvPicPr>
+        <p:blipFill>
+          <a:blip r:embed="rId3">
+            <a:extLst>
+              <a:ext uri="{28A0092B-C50C-407E-A947-70E740481C1C}">
+                <a14:useLocalDpi xmlns:a14="http://schemas.microsoft.com/office/drawing/2010/main" val="0"/>
+              </a:ext>
+            </a:extLst>
+          </a:blip>
+          <a:srcRect/>
+          <a:stretch/>
+        </p:blipFill>
+        <p:spPr>
+          <a:xfrm>
+            <a:off x="7675990" y="30481"/>
+            <a:ext cx="1490870" cy="1490870"/>
+          </a:xfrm>
+          <a:prstGeom prst="rect">
+            <a:avLst/>
+          </a:prstGeom>
+          <a:ln w="19050">
+            <a:noFill/>
+          </a:ln>
+          <a:effectLst>
+            <a:outerShdw blurRad="63500" sx="104000" sy="104000" algn="ctr" rotWithShape="0">
+              <a:srgbClr val="FFFF00"/>
+            </a:outerShdw>
+          </a:effectLst>
+        </p:spPr>
+      </p:pic>
+      <p:pic>
+        <p:nvPicPr>
+          <p:cNvPr id="15" name="Picture 14">
+            <a:extLst>
+              <a:ext uri="{FF2B5EF4-FFF2-40B4-BE49-F238E27FC236}">
+                <a16:creationId xmlns:a16="http://schemas.microsoft.com/office/drawing/2014/main" id="{69951C66-AF30-40DF-8A79-77E063C4A1E2}"/>
+              </a:ext>
+            </a:extLst>
+          </p:cNvPr>
+          <p:cNvPicPr>
+            <a:picLocks noChangeAspect="1"/>
+          </p:cNvPicPr>
+          <p:nvPr/>
+        </p:nvPicPr>
+        <p:blipFill>
+          <a:blip r:embed="rId4"/>
+          <a:stretch>
+            <a:fillRect/>
+          </a:stretch>
+        </p:blipFill>
+        <p:spPr>
+          <a:xfrm rot="5400000">
+            <a:off x="3905913" y="682935"/>
+            <a:ext cx="1332171" cy="4380672"/>
+          </a:xfrm>
+          <a:prstGeom prst="rect">
+            <a:avLst/>
+          </a:prstGeom>
+        </p:spPr>
+      </p:pic>
+      <p:pic>
+        <p:nvPicPr>
+          <p:cNvPr id="16" name="Picture 15">
+            <a:extLst>
+              <a:ext uri="{FF2B5EF4-FFF2-40B4-BE49-F238E27FC236}">
+                <a16:creationId xmlns:a16="http://schemas.microsoft.com/office/drawing/2014/main" id="{DF880083-CAF7-4CEF-BDFF-679AF67E6828}"/>
+              </a:ext>
+            </a:extLst>
+          </p:cNvPr>
+          <p:cNvPicPr>
+            <a:picLocks noChangeAspect="1"/>
+          </p:cNvPicPr>
+          <p:nvPr/>
+        </p:nvPicPr>
+        <p:blipFill>
+          <a:blip r:embed="rId5">
+            <a:extLst>
+              <a:ext uri="{28A0092B-C50C-407E-A947-70E740481C1C}">
+                <a14:useLocalDpi xmlns:a14="http://schemas.microsoft.com/office/drawing/2010/main" val="0"/>
+              </a:ext>
+            </a:extLst>
+          </a:blip>
+          <a:stretch>
+            <a:fillRect/>
+          </a:stretch>
+        </p:blipFill>
+        <p:spPr>
+          <a:xfrm>
+            <a:off x="5578044" y="824533"/>
+            <a:ext cx="666750" cy="857250"/>
+          </a:xfrm>
+          <a:prstGeom prst="rect">
+            <a:avLst/>
+          </a:prstGeom>
+        </p:spPr>
+      </p:pic>
+      <p:pic>
+        <p:nvPicPr>
+          <p:cNvPr id="3" name="Picture 2">
+            <a:extLst>
+              <a:ext uri="{FF2B5EF4-FFF2-40B4-BE49-F238E27FC236}">
+                <a16:creationId xmlns:a16="http://schemas.microsoft.com/office/drawing/2014/main" id="{9A783B84-1D0F-4F3A-AE42-9615CCB4AAF0}"/>
+              </a:ext>
+            </a:extLst>
+          </p:cNvPr>
+          <p:cNvPicPr>
+            <a:picLocks noChangeAspect="1"/>
+          </p:cNvPicPr>
+          <p:nvPr/>
+        </p:nvPicPr>
+        <p:blipFill rotWithShape="1">
+          <a:blip r:embed="rId6"/>
+          <a:srcRect t="35048" r="42928" b="36780"/>
+          <a:stretch/>
+        </p:blipFill>
+        <p:spPr>
+          <a:xfrm rot="21229319">
+            <a:off x="1633209" y="586704"/>
+            <a:ext cx="4344975" cy="322003"/>
+          </a:xfrm>
+          <a:prstGeom prst="rect">
+            <a:avLst/>
+          </a:prstGeom>
+        </p:spPr>
+      </p:pic>
+      <p:sp>
+        <p:nvSpPr>
+          <p:cNvPr id="18" name="TextBox 17">
+            <a:extLst>
+              <a:ext uri="{FF2B5EF4-FFF2-40B4-BE49-F238E27FC236}">
+                <a16:creationId xmlns:a16="http://schemas.microsoft.com/office/drawing/2014/main" id="{DE90D33D-101B-4FA2-ABC0-9FE2705D58B8}"/>
+              </a:ext>
+            </a:extLst>
+          </p:cNvPr>
+          <p:cNvSpPr txBox="1"/>
+          <p:nvPr/>
+        </p:nvSpPr>
+        <p:spPr>
+          <a:xfrm rot="21270040">
+            <a:off x="3188893" y="998962"/>
+            <a:ext cx="1915909" cy="923330"/>
+          </a:xfrm>
+          <a:prstGeom prst="rect">
+            <a:avLst/>
+          </a:prstGeom>
+          <a:noFill/>
+        </p:spPr>
+        <p:txBody>
+          <a:bodyPr wrap="square" rtlCol="0">
+            <a:spAutoFit/>
+          </a:bodyPr>
+          <a:lstStyle/>
+          <a:p>
+            <a:r>
+              <a:rPr lang="vi-VN" sz="5400" dirty="0">
+                <a:ln w="19050">
+                  <a:solidFill>
+                    <a:schemeClr val="tx1"/>
+                  </a:solidFill>
+                </a:ln>
+                <a:solidFill>
+                  <a:srgbClr val="FFFF00"/>
+                </a:solidFill>
+                <a:latin typeface="FVF Fernando 08" panose="02000507020000020003" pitchFamily="2" charset="0"/>
+              </a:rPr>
+              <a:t>???</a:t>
+            </a:r>
+            <a:endParaRPr lang="en-US" sz="5400" dirty="0">
+              <a:ln w="19050">
+                <a:solidFill>
+                  <a:schemeClr val="tx1"/>
+                </a:solidFill>
+              </a:ln>
+              <a:solidFill>
+                <a:srgbClr val="FFFF00"/>
+              </a:solidFill>
+              <a:latin typeface="FVF Fernando 08" panose="02000507020000020003" pitchFamily="2" charset="0"/>
+            </a:endParaRPr>
+          </a:p>
+        </p:txBody>
+      </p:sp>
+    </p:spTree>
+    <p:extLst>
+      <p:ext uri="{BB962C8B-B14F-4D97-AF65-F5344CB8AC3E}">
+        <p14:creationId xmlns:p14="http://schemas.microsoft.com/office/powerpoint/2010/main" val="66683334"/>
+      </p:ext>
+    </p:extLst>
+  </p:cSld>
+  <p:clrMapOvr>
+    <a:masterClrMapping/>
+  </p:clrMapOvr>
+</p:sld>
+</file>
+
+<file path=ppt/slides/slide90.xml><?xml version="1.0" encoding="utf-8"?>
 <p:sld xmlns:a="http://schemas.openxmlformats.org/drawingml/2006/main" xmlns:r="http://schemas.openxmlformats.org/officeDocument/2006/relationships" xmlns:p="http://schemas.openxmlformats.org/presentationml/2006/main">
   <p:cSld>
     <p:spTree>
@@ -43237,287 +43790,7 @@
 </p:sld>
 </file>
 
-<file path=ppt/slides/slide9.xml><?xml version="1.0" encoding="utf-8"?>
-<p:sld xmlns:a="http://schemas.openxmlformats.org/drawingml/2006/main" xmlns:r="http://schemas.openxmlformats.org/officeDocument/2006/relationships" xmlns:p="http://schemas.openxmlformats.org/presentationml/2006/main">
-  <p:cSld>
-    <p:spTree>
-      <p:nvGrpSpPr>
-        <p:cNvPr id="1" name=""/>
-        <p:cNvGrpSpPr/>
-        <p:nvPr/>
-      </p:nvGrpSpPr>
-      <p:grpSpPr>
-        <a:xfrm>
-          <a:off x="0" y="0"/>
-          <a:ext cx="0" cy="0"/>
-          <a:chOff x="0" y="0"/>
-          <a:chExt cx="0" cy="0"/>
-        </a:xfrm>
-      </p:grpSpPr>
-      <p:sp>
-        <p:nvSpPr>
-          <p:cNvPr id="11" name="TextBox 10">
-            <a:extLst>
-              <a:ext uri="{FF2B5EF4-FFF2-40B4-BE49-F238E27FC236}">
-                <a16:creationId xmlns:a16="http://schemas.microsoft.com/office/drawing/2014/main" id="{49A7B9B6-8455-43BE-8670-E01CE03933DF}"/>
-              </a:ext>
-            </a:extLst>
-          </p:cNvPr>
-          <p:cNvSpPr txBox="1"/>
-          <p:nvPr/>
-        </p:nvSpPr>
-        <p:spPr>
-          <a:xfrm>
-            <a:off x="2171343" y="3858413"/>
-            <a:ext cx="4801314" cy="1015663"/>
-          </a:xfrm>
-          <a:prstGeom prst="rect">
-            <a:avLst/>
-          </a:prstGeom>
-          <a:noFill/>
-        </p:spPr>
-        <p:txBody>
-          <a:bodyPr wrap="none" rtlCol="0">
-            <a:spAutoFit/>
-          </a:bodyPr>
-          <a:lstStyle/>
-          <a:p>
-            <a:r>
-              <a:rPr lang="vi-VN" sz="6000" dirty="0">
-                <a:ln w="19050">
-                  <a:solidFill>
-                    <a:schemeClr val="tx1"/>
-                  </a:solidFill>
-                </a:ln>
-                <a:solidFill>
-                  <a:srgbClr val="FFFF00"/>
-                </a:solidFill>
-                <a:latin typeface="FVF Fernando 08" panose="02000507020000020003" pitchFamily="2" charset="0"/>
-              </a:rPr>
-              <a:t>/damage</a:t>
-            </a:r>
-            <a:endParaRPr lang="en-US" sz="6000" dirty="0">
-              <a:ln w="19050">
-                <a:solidFill>
-                  <a:schemeClr val="tx1"/>
-                </a:solidFill>
-              </a:ln>
-              <a:solidFill>
-                <a:srgbClr val="FFFF00"/>
-              </a:solidFill>
-              <a:latin typeface="FVF Fernando 08" panose="02000507020000020003" pitchFamily="2" charset="0"/>
-            </a:endParaRPr>
-          </a:p>
-        </p:txBody>
-      </p:sp>
-      <p:pic>
-        <p:nvPicPr>
-          <p:cNvPr id="14" name="Picture 13">
-            <a:extLst>
-              <a:ext uri="{FF2B5EF4-FFF2-40B4-BE49-F238E27FC236}">
-                <a16:creationId xmlns:a16="http://schemas.microsoft.com/office/drawing/2014/main" id="{E2D411D6-C028-4F7B-96FB-CC2855017620}"/>
-              </a:ext>
-            </a:extLst>
-          </p:cNvPr>
-          <p:cNvPicPr>
-            <a:picLocks noChangeAspect="1"/>
-          </p:cNvPicPr>
-          <p:nvPr/>
-        </p:nvPicPr>
-        <p:blipFill>
-          <a:blip r:embed="rId3">
-            <a:extLst>
-              <a:ext uri="{28A0092B-C50C-407E-A947-70E740481C1C}">
-                <a14:useLocalDpi xmlns:a14="http://schemas.microsoft.com/office/drawing/2010/main" val="0"/>
-              </a:ext>
-            </a:extLst>
-          </a:blip>
-          <a:srcRect/>
-          <a:stretch/>
-        </p:blipFill>
-        <p:spPr>
-          <a:xfrm>
-            <a:off x="7675990" y="30481"/>
-            <a:ext cx="1490870" cy="1490870"/>
-          </a:xfrm>
-          <a:prstGeom prst="rect">
-            <a:avLst/>
-          </a:prstGeom>
-          <a:ln w="19050">
-            <a:noFill/>
-          </a:ln>
-          <a:effectLst>
-            <a:outerShdw blurRad="63500" sx="104000" sy="104000" algn="ctr" rotWithShape="0">
-              <a:srgbClr val="FFFF00"/>
-            </a:outerShdw>
-          </a:effectLst>
-        </p:spPr>
-      </p:pic>
-      <p:pic>
-        <p:nvPicPr>
-          <p:cNvPr id="15" name="Picture 14">
-            <a:extLst>
-              <a:ext uri="{FF2B5EF4-FFF2-40B4-BE49-F238E27FC236}">
-                <a16:creationId xmlns:a16="http://schemas.microsoft.com/office/drawing/2014/main" id="{69951C66-AF30-40DF-8A79-77E063C4A1E2}"/>
-              </a:ext>
-            </a:extLst>
-          </p:cNvPr>
-          <p:cNvPicPr>
-            <a:picLocks noChangeAspect="1"/>
-          </p:cNvPicPr>
-          <p:nvPr/>
-        </p:nvPicPr>
-        <p:blipFill>
-          <a:blip r:embed="rId4"/>
-          <a:stretch>
-            <a:fillRect/>
-          </a:stretch>
-        </p:blipFill>
-        <p:spPr>
-          <a:xfrm rot="5400000">
-            <a:off x="3905913" y="682935"/>
-            <a:ext cx="1332171" cy="4380672"/>
-          </a:xfrm>
-          <a:prstGeom prst="rect">
-            <a:avLst/>
-          </a:prstGeom>
-        </p:spPr>
-      </p:pic>
-      <p:pic>
-        <p:nvPicPr>
-          <p:cNvPr id="16" name="Picture 15">
-            <a:extLst>
-              <a:ext uri="{FF2B5EF4-FFF2-40B4-BE49-F238E27FC236}">
-                <a16:creationId xmlns:a16="http://schemas.microsoft.com/office/drawing/2014/main" id="{DF880083-CAF7-4CEF-BDFF-679AF67E6828}"/>
-              </a:ext>
-            </a:extLst>
-          </p:cNvPr>
-          <p:cNvPicPr>
-            <a:picLocks noChangeAspect="1"/>
-          </p:cNvPicPr>
-          <p:nvPr/>
-        </p:nvPicPr>
-        <p:blipFill>
-          <a:blip r:embed="rId5">
-            <a:extLst>
-              <a:ext uri="{28A0092B-C50C-407E-A947-70E740481C1C}">
-                <a14:useLocalDpi xmlns:a14="http://schemas.microsoft.com/office/drawing/2010/main" val="0"/>
-              </a:ext>
-            </a:extLst>
-          </a:blip>
-          <a:stretch>
-            <a:fillRect/>
-          </a:stretch>
-        </p:blipFill>
-        <p:spPr>
-          <a:xfrm>
-            <a:off x="5578044" y="824533"/>
-            <a:ext cx="666750" cy="857250"/>
-          </a:xfrm>
-          <a:prstGeom prst="rect">
-            <a:avLst/>
-          </a:prstGeom>
-        </p:spPr>
-      </p:pic>
-      <p:pic>
-        <p:nvPicPr>
-          <p:cNvPr id="3" name="Picture 2">
-            <a:extLst>
-              <a:ext uri="{FF2B5EF4-FFF2-40B4-BE49-F238E27FC236}">
-                <a16:creationId xmlns:a16="http://schemas.microsoft.com/office/drawing/2014/main" id="{9A783B84-1D0F-4F3A-AE42-9615CCB4AAF0}"/>
-              </a:ext>
-            </a:extLst>
-          </p:cNvPr>
-          <p:cNvPicPr>
-            <a:picLocks noChangeAspect="1"/>
-          </p:cNvPicPr>
-          <p:nvPr/>
-        </p:nvPicPr>
-        <p:blipFill rotWithShape="1">
-          <a:blip r:embed="rId6"/>
-          <a:srcRect t="35048" r="42928" b="36780"/>
-          <a:stretch/>
-        </p:blipFill>
-        <p:spPr>
-          <a:xfrm rot="21229319">
-            <a:off x="1633209" y="586704"/>
-            <a:ext cx="4344975" cy="322003"/>
-          </a:xfrm>
-          <a:prstGeom prst="rect">
-            <a:avLst/>
-          </a:prstGeom>
-        </p:spPr>
-      </p:pic>
-      <p:sp>
-        <p:nvSpPr>
-          <p:cNvPr id="18" name="TextBox 17">
-            <a:extLst>
-              <a:ext uri="{FF2B5EF4-FFF2-40B4-BE49-F238E27FC236}">
-                <a16:creationId xmlns:a16="http://schemas.microsoft.com/office/drawing/2014/main" id="{DE90D33D-101B-4FA2-ABC0-9FE2705D58B8}"/>
-              </a:ext>
-            </a:extLst>
-          </p:cNvPr>
-          <p:cNvSpPr txBox="1"/>
-          <p:nvPr/>
-        </p:nvSpPr>
-        <p:spPr>
-          <a:xfrm rot="21270040">
-            <a:off x="3188893" y="998962"/>
-            <a:ext cx="1915909" cy="923330"/>
-          </a:xfrm>
-          <a:prstGeom prst="rect">
-            <a:avLst/>
-          </a:prstGeom>
-          <a:noFill/>
-        </p:spPr>
-        <p:txBody>
-          <a:bodyPr wrap="square" rtlCol="0">
-            <a:spAutoFit/>
-          </a:bodyPr>
-          <a:lstStyle/>
-          <a:p>
-            <a:r>
-              <a:rPr lang="vi-VN" sz="5400" dirty="0">
-                <a:ln w="19050">
-                  <a:solidFill>
-                    <a:schemeClr val="tx1"/>
-                  </a:solidFill>
-                </a:ln>
-                <a:solidFill>
-                  <a:srgbClr val="FFFF00"/>
-                </a:solidFill>
-                <a:latin typeface="FVF Fernando 08" panose="02000507020000020003" pitchFamily="2" charset="0"/>
-              </a:rPr>
-              <a:t>???</a:t>
-            </a:r>
-            <a:endParaRPr lang="en-US" sz="5400" dirty="0">
-              <a:ln w="19050">
-                <a:solidFill>
-                  <a:schemeClr val="tx1"/>
-                </a:solidFill>
-              </a:ln>
-              <a:solidFill>
-                <a:srgbClr val="FFFF00"/>
-              </a:solidFill>
-              <a:latin typeface="FVF Fernando 08" panose="02000507020000020003" pitchFamily="2" charset="0"/>
-            </a:endParaRPr>
-          </a:p>
-        </p:txBody>
-      </p:sp>
-    </p:spTree>
-    <p:extLst>
-      <p:ext uri="{BB962C8B-B14F-4D97-AF65-F5344CB8AC3E}">
-        <p14:creationId xmlns:p14="http://schemas.microsoft.com/office/powerpoint/2010/main" val="66683334"/>
-      </p:ext>
-    </p:extLst>
-  </p:cSld>
-  <p:clrMapOvr>
-    <a:masterClrMapping/>
-  </p:clrMapOvr>
-</p:sld>
-</file>
-
-<file path=ppt/slides/slide90.xml><?xml version="1.0" encoding="utf-8"?>
+<file path=ppt/slides/slide91.xml><?xml version="1.0" encoding="utf-8"?>
 <p:sld xmlns:a="http://schemas.openxmlformats.org/drawingml/2006/main" xmlns:r="http://schemas.openxmlformats.org/officeDocument/2006/relationships" xmlns:p="http://schemas.openxmlformats.org/presentationml/2006/main">
   <p:cSld>
     <p:spTree>
@@ -43787,7 +44060,7 @@
 </p:sld>
 </file>
 
-<file path=ppt/slides/slide91.xml><?xml version="1.0" encoding="utf-8"?>
+<file path=ppt/slides/slide92.xml><?xml version="1.0" encoding="utf-8"?>
 <p:sld xmlns:a="http://schemas.openxmlformats.org/drawingml/2006/main" xmlns:r="http://schemas.openxmlformats.org/officeDocument/2006/relationships" xmlns:p="http://schemas.openxmlformats.org/presentationml/2006/main">
   <p:cSld>
     <p:spTree>
@@ -43972,7 +44245,7 @@
 </p:sld>
 </file>
 
-<file path=ppt/slides/slide92.xml><?xml version="1.0" encoding="utf-8"?>
+<file path=ppt/slides/slide93.xml><?xml version="1.0" encoding="utf-8"?>
 <p:sld xmlns:a="http://schemas.openxmlformats.org/drawingml/2006/main" xmlns:r="http://schemas.openxmlformats.org/officeDocument/2006/relationships" xmlns:p="http://schemas.openxmlformats.org/presentationml/2006/main">
   <p:cSld>
     <p:spTree>
@@ -44157,7 +44430,7 @@
 </p:sld>
 </file>
 
-<file path=ppt/slides/slide93.xml><?xml version="1.0" encoding="utf-8"?>
+<file path=ppt/slides/slide94.xml><?xml version="1.0" encoding="utf-8"?>
 <p:sld xmlns:a="http://schemas.openxmlformats.org/drawingml/2006/main" xmlns:r="http://schemas.openxmlformats.org/officeDocument/2006/relationships" xmlns:p="http://schemas.openxmlformats.org/presentationml/2006/main">
   <p:cSld>
     <p:spTree>
@@ -44322,7 +44595,7 @@
 </p:sld>
 </file>
 
-<file path=ppt/slides/slide94.xml><?xml version="1.0" encoding="utf-8"?>
+<file path=ppt/slides/slide95.xml><?xml version="1.0" encoding="utf-8"?>
 <p:sld xmlns:a="http://schemas.openxmlformats.org/drawingml/2006/main" xmlns:r="http://schemas.openxmlformats.org/officeDocument/2006/relationships" xmlns:p="http://schemas.openxmlformats.org/presentationml/2006/main">
   <p:cSld>
     <p:spTree>
@@ -44476,7 +44749,7 @@
 </p:sld>
 </file>
 
-<file path=ppt/slides/slide95.xml><?xml version="1.0" encoding="utf-8"?>
+<file path=ppt/slides/slide96.xml><?xml version="1.0" encoding="utf-8"?>
 <p:sld xmlns:a="http://schemas.openxmlformats.org/drawingml/2006/main" xmlns:r="http://schemas.openxmlformats.org/officeDocument/2006/relationships" xmlns:p="http://schemas.openxmlformats.org/presentationml/2006/main">
   <p:cSld>
     <p:spTree>
@@ -44624,7 +44897,7 @@
 </p:sld>
 </file>
 
-<file path=ppt/slides/slide96.xml><?xml version="1.0" encoding="utf-8"?>
+<file path=ppt/slides/slide97.xml><?xml version="1.0" encoding="utf-8"?>
 <p:sld xmlns:a="http://schemas.openxmlformats.org/drawingml/2006/main" xmlns:r="http://schemas.openxmlformats.org/officeDocument/2006/relationships" xmlns:p="http://schemas.openxmlformats.org/presentationml/2006/main">
   <p:cSld>
     <p:spTree>

</xml_diff>

<commit_message>
Add NPC page & correct mistakes
</commit_message>
<xml_diff>
--- a/assets/media/thumbnail/template.pptx
+++ b/assets/media/thumbnail/template.pptx
@@ -5,7 +5,7 @@
     <p:sldMasterId id="2147483660" r:id="rId1"/>
   </p:sldMasterIdLst>
   <p:notesMasterIdLst>
-    <p:notesMasterId r:id="rId103"/>
+    <p:notesMasterId r:id="rId104"/>
   </p:notesMasterIdLst>
   <p:sldIdLst>
     <p:sldId id="259" r:id="rId2"/>
@@ -99,16 +99,17 @@
     <p:sldId id="356" r:id="rId90"/>
     <p:sldId id="346" r:id="rId91"/>
     <p:sldId id="358" r:id="rId92"/>
-    <p:sldId id="351" r:id="rId93"/>
-    <p:sldId id="352" r:id="rId94"/>
-    <p:sldId id="353" r:id="rId95"/>
-    <p:sldId id="354" r:id="rId96"/>
-    <p:sldId id="355" r:id="rId97"/>
-    <p:sldId id="357" r:id="rId98"/>
-    <p:sldId id="360" r:id="rId99"/>
-    <p:sldId id="349" r:id="rId100"/>
-    <p:sldId id="350" r:id="rId101"/>
-    <p:sldId id="332" r:id="rId102"/>
+    <p:sldId id="353" r:id="rId93"/>
+    <p:sldId id="351" r:id="rId94"/>
+    <p:sldId id="352" r:id="rId95"/>
+    <p:sldId id="361" r:id="rId96"/>
+    <p:sldId id="354" r:id="rId97"/>
+    <p:sldId id="355" r:id="rId98"/>
+    <p:sldId id="357" r:id="rId99"/>
+    <p:sldId id="360" r:id="rId100"/>
+    <p:sldId id="349" r:id="rId101"/>
+    <p:sldId id="350" r:id="rId102"/>
+    <p:sldId id="332" r:id="rId103"/>
   </p:sldIdLst>
   <p:sldSz cx="9144000" cy="5143500" type="screen16x9"/>
   <p:notesSz cx="6858000" cy="9144000"/>
@@ -311,9 +312,10 @@
         </p14:section>
         <p14:section name="Thông tin liên quan" id="{CD6A83CE-D8E8-425A-8590-7E36356EE3E0}">
           <p14:sldIdLst>
+            <p14:sldId id="353"/>
             <p14:sldId id="351"/>
             <p14:sldId id="352"/>
-            <p14:sldId id="353"/>
+            <p14:sldId id="361"/>
           </p14:sldIdLst>
         </p14:section>
         <p14:section name="Web Tool" id="{E539C44A-176F-46D9-A494-E02E57FF3620}">
@@ -438,7 +440,7 @@
           <a:p>
             <a:fld id="{DAF7419A-5719-4DB0-801F-AE25AB2C4835}" type="datetimeFigureOut">
               <a:rPr lang="en-US" smtClean="0"/>
-              <a:t>5/19/2022</a:t>
+              <a:t>7/2/2022</a:t>
             </a:fld>
             <a:endParaRPr lang="en-US" dirty="0"/>
           </a:p>
@@ -953,7 +955,7 @@
     </p:spTree>
     <p:extLst>
       <p:ext uri="{BB962C8B-B14F-4D97-AF65-F5344CB8AC3E}">
-        <p14:creationId xmlns:p14="http://schemas.microsoft.com/office/powerpoint/2010/main" val="2087517936"/>
+        <p14:creationId xmlns:p14="http://schemas.microsoft.com/office/powerpoint/2010/main" val="418430412"/>
       </p:ext>
     </p:extLst>
   </p:cSld>
@@ -1029,6 +1031,90 @@
             <a:fld id="{BF1434EF-918F-4A4D-98D1-563F3F7CA387}" type="slidenum">
               <a:rPr lang="en-US" smtClean="0"/>
               <a:t>101</a:t>
+            </a:fld>
+            <a:endParaRPr lang="en-US" dirty="0"/>
+          </a:p>
+        </p:txBody>
+      </p:sp>
+    </p:spTree>
+    <p:extLst>
+      <p:ext uri="{BB962C8B-B14F-4D97-AF65-F5344CB8AC3E}">
+        <p14:creationId xmlns:p14="http://schemas.microsoft.com/office/powerpoint/2010/main" val="2087517936"/>
+      </p:ext>
+    </p:extLst>
+  </p:cSld>
+  <p:clrMapOvr>
+    <a:masterClrMapping/>
+  </p:clrMapOvr>
+</p:notes>
+</file>
+
+<file path=ppt/notesSlides/notesSlide102.xml><?xml version="1.0" encoding="utf-8"?>
+<p:notes xmlns:a="http://schemas.openxmlformats.org/drawingml/2006/main" xmlns:r="http://schemas.openxmlformats.org/officeDocument/2006/relationships" xmlns:p="http://schemas.openxmlformats.org/presentationml/2006/main">
+  <p:cSld>
+    <p:spTree>
+      <p:nvGrpSpPr>
+        <p:cNvPr id="1" name=""/>
+        <p:cNvGrpSpPr/>
+        <p:nvPr/>
+      </p:nvGrpSpPr>
+      <p:grpSpPr>
+        <a:xfrm>
+          <a:off x="0" y="0"/>
+          <a:ext cx="0" cy="0"/>
+          <a:chOff x="0" y="0"/>
+          <a:chExt cx="0" cy="0"/>
+        </a:xfrm>
+      </p:grpSpPr>
+      <p:sp>
+        <p:nvSpPr>
+          <p:cNvPr id="2" name="Slide Image Placeholder 1"/>
+          <p:cNvSpPr>
+            <a:spLocks noGrp="1" noRot="1" noChangeAspect="1"/>
+          </p:cNvSpPr>
+          <p:nvPr>
+            <p:ph type="sldImg"/>
+          </p:nvPr>
+        </p:nvSpPr>
+        <p:spPr/>
+      </p:sp>
+      <p:sp>
+        <p:nvSpPr>
+          <p:cNvPr id="3" name="Notes Placeholder 2"/>
+          <p:cNvSpPr>
+            <a:spLocks noGrp="1"/>
+          </p:cNvSpPr>
+          <p:nvPr>
+            <p:ph type="body" idx="1"/>
+          </p:nvPr>
+        </p:nvSpPr>
+        <p:spPr/>
+        <p:txBody>
+          <a:bodyPr/>
+          <a:lstStyle/>
+          <a:p>
+            <a:endParaRPr lang="vi-VN" dirty="0"/>
+          </a:p>
+        </p:txBody>
+      </p:sp>
+      <p:sp>
+        <p:nvSpPr>
+          <p:cNvPr id="4" name="Slide Number Placeholder 3"/>
+          <p:cNvSpPr>
+            <a:spLocks noGrp="1"/>
+          </p:cNvSpPr>
+          <p:nvPr>
+            <p:ph type="sldNum" sz="quarter" idx="5"/>
+          </p:nvPr>
+        </p:nvSpPr>
+        <p:spPr/>
+        <p:txBody>
+          <a:bodyPr/>
+          <a:lstStyle/>
+          <a:p>
+            <a:fld id="{BF1434EF-918F-4A4D-98D1-563F3F7CA387}" type="slidenum">
+              <a:rPr lang="en-US" smtClean="0"/>
+              <a:t>102</a:t>
             </a:fld>
             <a:endParaRPr lang="en-US" dirty="0"/>
           </a:p>
@@ -8864,7 +8950,7 @@
     </p:spTree>
     <p:extLst>
       <p:ext uri="{BB962C8B-B14F-4D97-AF65-F5344CB8AC3E}">
-        <p14:creationId xmlns:p14="http://schemas.microsoft.com/office/powerpoint/2010/main" val="1580828146"/>
+        <p14:creationId xmlns:p14="http://schemas.microsoft.com/office/powerpoint/2010/main" val="3795521162"/>
       </p:ext>
     </p:extLst>
   </p:cSld>
@@ -8948,7 +9034,7 @@
     </p:spTree>
     <p:extLst>
       <p:ext uri="{BB962C8B-B14F-4D97-AF65-F5344CB8AC3E}">
-        <p14:creationId xmlns:p14="http://schemas.microsoft.com/office/powerpoint/2010/main" val="880678517"/>
+        <p14:creationId xmlns:p14="http://schemas.microsoft.com/office/powerpoint/2010/main" val="1580828146"/>
       </p:ext>
     </p:extLst>
   </p:cSld>
@@ -9032,7 +9118,7 @@
     </p:spTree>
     <p:extLst>
       <p:ext uri="{BB962C8B-B14F-4D97-AF65-F5344CB8AC3E}">
-        <p14:creationId xmlns:p14="http://schemas.microsoft.com/office/powerpoint/2010/main" val="3795521162"/>
+        <p14:creationId xmlns:p14="http://schemas.microsoft.com/office/powerpoint/2010/main" val="880678517"/>
       </p:ext>
     </p:extLst>
   </p:cSld>
@@ -9116,7 +9202,7 @@
     </p:spTree>
     <p:extLst>
       <p:ext uri="{BB962C8B-B14F-4D97-AF65-F5344CB8AC3E}">
-        <p14:creationId xmlns:p14="http://schemas.microsoft.com/office/powerpoint/2010/main" val="232954569"/>
+        <p14:creationId xmlns:p14="http://schemas.microsoft.com/office/powerpoint/2010/main" val="273468379"/>
       </p:ext>
     </p:extLst>
   </p:cSld>
@@ -9200,7 +9286,7 @@
     </p:spTree>
     <p:extLst>
       <p:ext uri="{BB962C8B-B14F-4D97-AF65-F5344CB8AC3E}">
-        <p14:creationId xmlns:p14="http://schemas.microsoft.com/office/powerpoint/2010/main" val="3301698305"/>
+        <p14:creationId xmlns:p14="http://schemas.microsoft.com/office/powerpoint/2010/main" val="232954569"/>
       </p:ext>
     </p:extLst>
   </p:cSld>
@@ -9284,7 +9370,7 @@
     </p:spTree>
     <p:extLst>
       <p:ext uri="{BB962C8B-B14F-4D97-AF65-F5344CB8AC3E}">
-        <p14:creationId xmlns:p14="http://schemas.microsoft.com/office/powerpoint/2010/main" val="397470668"/>
+        <p14:creationId xmlns:p14="http://schemas.microsoft.com/office/powerpoint/2010/main" val="3301698305"/>
       </p:ext>
     </p:extLst>
   </p:cSld>
@@ -9368,7 +9454,7 @@
     </p:spTree>
     <p:extLst>
       <p:ext uri="{BB962C8B-B14F-4D97-AF65-F5344CB8AC3E}">
-        <p14:creationId xmlns:p14="http://schemas.microsoft.com/office/powerpoint/2010/main" val="2823396353"/>
+        <p14:creationId xmlns:p14="http://schemas.microsoft.com/office/powerpoint/2010/main" val="397470668"/>
       </p:ext>
     </p:extLst>
   </p:cSld>
@@ -9452,7 +9538,7 @@
     </p:spTree>
     <p:extLst>
       <p:ext uri="{BB962C8B-B14F-4D97-AF65-F5344CB8AC3E}">
-        <p14:creationId xmlns:p14="http://schemas.microsoft.com/office/powerpoint/2010/main" val="418430412"/>
+        <p14:creationId xmlns:p14="http://schemas.microsoft.com/office/powerpoint/2010/main" val="2823396353"/>
       </p:ext>
     </p:extLst>
   </p:cSld>
@@ -9593,7 +9679,7 @@
           <a:p>
             <a:fld id="{6BAADE55-1DD3-44E1-A8C2-24E0E03344A6}" type="datetimeFigureOut">
               <a:rPr lang="en-US" smtClean="0"/>
-              <a:t>5/19/2022</a:t>
+              <a:t>7/2/2022</a:t>
             </a:fld>
             <a:endParaRPr lang="en-US" dirty="0"/>
           </a:p>
@@ -9763,7 +9849,7 @@
           <a:p>
             <a:fld id="{6BAADE55-1DD3-44E1-A8C2-24E0E03344A6}" type="datetimeFigureOut">
               <a:rPr lang="en-US" smtClean="0"/>
-              <a:t>5/19/2022</a:t>
+              <a:t>7/2/2022</a:t>
             </a:fld>
             <a:endParaRPr lang="en-US" dirty="0"/>
           </a:p>
@@ -9943,7 +10029,7 @@
           <a:p>
             <a:fld id="{6BAADE55-1DD3-44E1-A8C2-24E0E03344A6}" type="datetimeFigureOut">
               <a:rPr lang="en-US" smtClean="0"/>
-              <a:t>5/19/2022</a:t>
+              <a:t>7/2/2022</a:t>
             </a:fld>
             <a:endParaRPr lang="en-US" dirty="0"/>
           </a:p>
@@ -10113,7 +10199,7 @@
           <a:p>
             <a:fld id="{6BAADE55-1DD3-44E1-A8C2-24E0E03344A6}" type="datetimeFigureOut">
               <a:rPr lang="en-US" smtClean="0"/>
-              <a:t>5/19/2022</a:t>
+              <a:t>7/2/2022</a:t>
             </a:fld>
             <a:endParaRPr lang="en-US" dirty="0"/>
           </a:p>
@@ -10359,7 +10445,7 @@
           <a:p>
             <a:fld id="{6BAADE55-1DD3-44E1-A8C2-24E0E03344A6}" type="datetimeFigureOut">
               <a:rPr lang="en-US" smtClean="0"/>
-              <a:t>5/19/2022</a:t>
+              <a:t>7/2/2022</a:t>
             </a:fld>
             <a:endParaRPr lang="en-US" dirty="0"/>
           </a:p>
@@ -10591,7 +10677,7 @@
           <a:p>
             <a:fld id="{6BAADE55-1DD3-44E1-A8C2-24E0E03344A6}" type="datetimeFigureOut">
               <a:rPr lang="en-US" smtClean="0"/>
-              <a:t>5/19/2022</a:t>
+              <a:t>7/2/2022</a:t>
             </a:fld>
             <a:endParaRPr lang="en-US" dirty="0"/>
           </a:p>
@@ -10958,7 +11044,7 @@
           <a:p>
             <a:fld id="{6BAADE55-1DD3-44E1-A8C2-24E0E03344A6}" type="datetimeFigureOut">
               <a:rPr lang="en-US" smtClean="0"/>
-              <a:t>5/19/2022</a:t>
+              <a:t>7/2/2022</a:t>
             </a:fld>
             <a:endParaRPr lang="en-US" dirty="0"/>
           </a:p>
@@ -11076,7 +11162,7 @@
           <a:p>
             <a:fld id="{6BAADE55-1DD3-44E1-A8C2-24E0E03344A6}" type="datetimeFigureOut">
               <a:rPr lang="en-US" smtClean="0"/>
-              <a:t>5/19/2022</a:t>
+              <a:t>7/2/2022</a:t>
             </a:fld>
             <a:endParaRPr lang="en-US" dirty="0"/>
           </a:p>
@@ -11171,7 +11257,7 @@
           <a:p>
             <a:fld id="{6BAADE55-1DD3-44E1-A8C2-24E0E03344A6}" type="datetimeFigureOut">
               <a:rPr lang="en-US" smtClean="0"/>
-              <a:t>5/19/2022</a:t>
+              <a:t>7/2/2022</a:t>
             </a:fld>
             <a:endParaRPr lang="en-US" dirty="0"/>
           </a:p>
@@ -11448,7 +11534,7 @@
           <a:p>
             <a:fld id="{6BAADE55-1DD3-44E1-A8C2-24E0E03344A6}" type="datetimeFigureOut">
               <a:rPr lang="en-US" smtClean="0"/>
-              <a:t>5/19/2022</a:t>
+              <a:t>7/2/2022</a:t>
             </a:fld>
             <a:endParaRPr lang="en-US" dirty="0"/>
           </a:p>
@@ -11704,7 +11790,7 @@
           <a:p>
             <a:fld id="{6BAADE55-1DD3-44E1-A8C2-24E0E03344A6}" type="datetimeFigureOut">
               <a:rPr lang="en-US" smtClean="0"/>
-              <a:t>5/19/2022</a:t>
+              <a:t>7/2/2022</a:t>
             </a:fld>
             <a:endParaRPr lang="en-US" dirty="0"/>
           </a:p>
@@ -11923,7 +12009,7 @@
           <a:p>
             <a:fld id="{6BAADE55-1DD3-44E1-A8C2-24E0E03344A6}" type="datetimeFigureOut">
               <a:rPr lang="en-US" smtClean="0"/>
-              <a:t>5/19/2022</a:t>
+              <a:t>7/2/2022</a:t>
             </a:fld>
             <a:endParaRPr lang="en-US" dirty="0"/>
           </a:p>
@@ -12723,6 +12809,160 @@
         </p:nvSpPr>
         <p:spPr>
           <a:xfrm>
+            <a:off x="1834712" y="3858413"/>
+            <a:ext cx="5474576" cy="1015663"/>
+          </a:xfrm>
+          <a:prstGeom prst="rect">
+            <a:avLst/>
+          </a:prstGeom>
+          <a:noFill/>
+        </p:spPr>
+        <p:txBody>
+          <a:bodyPr wrap="none" rtlCol="0">
+            <a:spAutoFit/>
+          </a:bodyPr>
+          <a:lstStyle/>
+          <a:p>
+            <a:r>
+              <a:rPr lang="en-US" sz="6000" dirty="0">
+                <a:ln w="19050">
+                  <a:solidFill>
+                    <a:schemeClr val="tx1"/>
+                  </a:solidFill>
+                </a:ln>
+                <a:solidFill>
+                  <a:srgbClr val="FFFF00"/>
+                </a:solidFill>
+                <a:latin typeface="FVF Fernando 08" panose="02000507020000020003" pitchFamily="2" charset="0"/>
+              </a:rPr>
+              <a:t>Easter Egg</a:t>
+            </a:r>
+          </a:p>
+        </p:txBody>
+      </p:sp>
+      <p:pic>
+        <p:nvPicPr>
+          <p:cNvPr id="14" name="Picture 13">
+            <a:extLst>
+              <a:ext uri="{FF2B5EF4-FFF2-40B4-BE49-F238E27FC236}">
+                <a16:creationId xmlns:a16="http://schemas.microsoft.com/office/drawing/2014/main" id="{E2D411D6-C028-4F7B-96FB-CC2855017620}"/>
+              </a:ext>
+            </a:extLst>
+          </p:cNvPr>
+          <p:cNvPicPr>
+            <a:picLocks noChangeAspect="1"/>
+          </p:cNvPicPr>
+          <p:nvPr/>
+        </p:nvPicPr>
+        <p:blipFill>
+          <a:blip r:embed="rId3">
+            <a:extLst>
+              <a:ext uri="{28A0092B-C50C-407E-A947-70E740481C1C}">
+                <a14:useLocalDpi xmlns:a14="http://schemas.microsoft.com/office/drawing/2010/main" val="0"/>
+              </a:ext>
+            </a:extLst>
+          </a:blip>
+          <a:srcRect/>
+          <a:stretch/>
+        </p:blipFill>
+        <p:spPr>
+          <a:xfrm>
+            <a:off x="7675990" y="30481"/>
+            <a:ext cx="1490870" cy="1490870"/>
+          </a:xfrm>
+          <a:prstGeom prst="rect">
+            <a:avLst/>
+          </a:prstGeom>
+          <a:ln w="19050">
+            <a:noFill/>
+          </a:ln>
+          <a:effectLst>
+            <a:outerShdw blurRad="63500" sx="104000" sy="104000" algn="ctr" rotWithShape="0">
+              <a:srgbClr val="FFFF00"/>
+            </a:outerShdw>
+          </a:effectLst>
+        </p:spPr>
+      </p:pic>
+      <p:pic>
+        <p:nvPicPr>
+          <p:cNvPr id="4" name="Picture 3">
+            <a:extLst>
+              <a:ext uri="{FF2B5EF4-FFF2-40B4-BE49-F238E27FC236}">
+                <a16:creationId xmlns:a16="http://schemas.microsoft.com/office/drawing/2014/main" id="{62FA9332-BDFE-41E2-9F3F-7000995C0D5E}"/>
+              </a:ext>
+            </a:extLst>
+          </p:cNvPr>
+          <p:cNvPicPr>
+            <a:picLocks noChangeAspect="1"/>
+          </p:cNvPicPr>
+          <p:nvPr/>
+        </p:nvPicPr>
+        <p:blipFill>
+          <a:blip r:embed="rId4">
+            <a:extLst>
+              <a:ext uri="{28A0092B-C50C-407E-A947-70E740481C1C}">
+                <a14:useLocalDpi xmlns:a14="http://schemas.microsoft.com/office/drawing/2010/main" val="0"/>
+              </a:ext>
+            </a:extLst>
+          </a:blip>
+          <a:stretch>
+            <a:fillRect/>
+          </a:stretch>
+        </p:blipFill>
+        <p:spPr>
+          <a:xfrm>
+            <a:off x="3157937" y="775916"/>
+            <a:ext cx="2828125" cy="2828125"/>
+          </a:xfrm>
+          <a:prstGeom prst="rect">
+            <a:avLst/>
+          </a:prstGeom>
+        </p:spPr>
+      </p:pic>
+    </p:spTree>
+    <p:extLst>
+      <p:ext uri="{BB962C8B-B14F-4D97-AF65-F5344CB8AC3E}">
+        <p14:creationId xmlns:p14="http://schemas.microsoft.com/office/powerpoint/2010/main" val="312882953"/>
+      </p:ext>
+    </p:extLst>
+  </p:cSld>
+  <p:clrMapOvr>
+    <a:masterClrMapping/>
+  </p:clrMapOvr>
+</p:sld>
+</file>
+
+<file path=ppt/slides/slide101.xml><?xml version="1.0" encoding="utf-8"?>
+<p:sld xmlns:a="http://schemas.openxmlformats.org/drawingml/2006/main" xmlns:r="http://schemas.openxmlformats.org/officeDocument/2006/relationships" xmlns:p="http://schemas.openxmlformats.org/presentationml/2006/main">
+  <p:cSld>
+    <p:spTree>
+      <p:nvGrpSpPr>
+        <p:cNvPr id="1" name=""/>
+        <p:cNvGrpSpPr/>
+        <p:nvPr/>
+      </p:nvGrpSpPr>
+      <p:grpSpPr>
+        <a:xfrm>
+          <a:off x="0" y="0"/>
+          <a:ext cx="0" cy="0"/>
+          <a:chOff x="0" y="0"/>
+          <a:chExt cx="0" cy="0"/>
+        </a:xfrm>
+      </p:grpSpPr>
+      <p:sp>
+        <p:nvSpPr>
+          <p:cNvPr id="11" name="TextBox 10">
+            <a:extLst>
+              <a:ext uri="{FF2B5EF4-FFF2-40B4-BE49-F238E27FC236}">
+                <a16:creationId xmlns:a16="http://schemas.microsoft.com/office/drawing/2014/main" id="{49A7B9B6-8455-43BE-8670-E01CE03933DF}"/>
+              </a:ext>
+            </a:extLst>
+          </p:cNvPr>
+          <p:cNvSpPr txBox="1"/>
+          <p:nvPr/>
+        </p:nvSpPr>
+        <p:spPr>
+          <a:xfrm>
             <a:off x="3854495" y="3858413"/>
             <a:ext cx="1435008" cy="1015663"/>
           </a:xfrm>
@@ -12840,7 +13080,7 @@
 </p:sld>
 </file>
 
-<file path=ppt/slides/slide101.xml><?xml version="1.0" encoding="utf-8"?>
+<file path=ppt/slides/slide102.xml><?xml version="1.0" encoding="utf-8"?>
 <p:sld xmlns:a="http://schemas.openxmlformats.org/drawingml/2006/main" xmlns:r="http://schemas.openxmlformats.org/officeDocument/2006/relationships" xmlns:p="http://schemas.openxmlformats.org/presentationml/2006/main">
   <p:cSld>
     <p:spTree>
@@ -45239,6 +45479,191 @@
         </p:nvSpPr>
         <p:spPr>
           <a:xfrm>
+            <a:off x="1353810" y="3961026"/>
+            <a:ext cx="6436377" cy="1015663"/>
+          </a:xfrm>
+          <a:prstGeom prst="rect">
+            <a:avLst/>
+          </a:prstGeom>
+          <a:noFill/>
+        </p:spPr>
+        <p:txBody>
+          <a:bodyPr wrap="none" rtlCol="0">
+            <a:spAutoFit/>
+          </a:bodyPr>
+          <a:lstStyle/>
+          <a:p>
+            <a:r>
+              <a:rPr lang="vi-VN" sz="6000" dirty="0">
+                <a:ln w="19050">
+                  <a:solidFill>
+                    <a:schemeClr val="tx1"/>
+                  </a:solidFill>
+                </a:ln>
+                <a:solidFill>
+                  <a:srgbClr val="FFFF00"/>
+                </a:solidFill>
+                <a:latin typeface="FVF Fernando 08" panose="02000507020000020003" pitchFamily="2" charset="0"/>
+              </a:rPr>
+              <a:t>Toán tử kí tự</a:t>
+            </a:r>
+            <a:endParaRPr lang="en-US" sz="6000" dirty="0">
+              <a:ln w="19050">
+                <a:solidFill>
+                  <a:schemeClr val="tx1"/>
+                </a:solidFill>
+              </a:ln>
+              <a:solidFill>
+                <a:srgbClr val="FFFF00"/>
+              </a:solidFill>
+              <a:latin typeface="FVF Fernando 08" panose="02000507020000020003" pitchFamily="2" charset="0"/>
+            </a:endParaRPr>
+          </a:p>
+        </p:txBody>
+      </p:sp>
+      <p:pic>
+        <p:nvPicPr>
+          <p:cNvPr id="14" name="Picture 13">
+            <a:extLst>
+              <a:ext uri="{FF2B5EF4-FFF2-40B4-BE49-F238E27FC236}">
+                <a16:creationId xmlns:a16="http://schemas.microsoft.com/office/drawing/2014/main" id="{E2D411D6-C028-4F7B-96FB-CC2855017620}"/>
+              </a:ext>
+            </a:extLst>
+          </p:cNvPr>
+          <p:cNvPicPr>
+            <a:picLocks noChangeAspect="1"/>
+          </p:cNvPicPr>
+          <p:nvPr/>
+        </p:nvPicPr>
+        <p:blipFill>
+          <a:blip r:embed="rId3">
+            <a:extLst>
+              <a:ext uri="{28A0092B-C50C-407E-A947-70E740481C1C}">
+                <a14:useLocalDpi xmlns:a14="http://schemas.microsoft.com/office/drawing/2010/main" val="0"/>
+              </a:ext>
+            </a:extLst>
+          </a:blip>
+          <a:srcRect/>
+          <a:stretch/>
+        </p:blipFill>
+        <p:spPr>
+          <a:xfrm>
+            <a:off x="7675990" y="30481"/>
+            <a:ext cx="1490870" cy="1490870"/>
+          </a:xfrm>
+          <a:prstGeom prst="rect">
+            <a:avLst/>
+          </a:prstGeom>
+          <a:ln w="19050">
+            <a:noFill/>
+          </a:ln>
+          <a:effectLst>
+            <a:outerShdw blurRad="63500" sx="104000" sy="104000" algn="ctr" rotWithShape="0">
+              <a:srgbClr val="FFFF00"/>
+            </a:outerShdw>
+          </a:effectLst>
+        </p:spPr>
+      </p:pic>
+      <p:sp>
+        <p:nvSpPr>
+          <p:cNvPr id="7" name="TextBox 6">
+            <a:extLst>
+              <a:ext uri="{FF2B5EF4-FFF2-40B4-BE49-F238E27FC236}">
+                <a16:creationId xmlns:a16="http://schemas.microsoft.com/office/drawing/2014/main" id="{C11996F8-5179-4D29-B915-8A8107AC8A3F}"/>
+              </a:ext>
+            </a:extLst>
+          </p:cNvPr>
+          <p:cNvSpPr txBox="1"/>
+          <p:nvPr/>
+        </p:nvSpPr>
+        <p:spPr>
+          <a:xfrm>
+            <a:off x="2445454" y="2110085"/>
+            <a:ext cx="4253087" cy="923330"/>
+          </a:xfrm>
+          <a:prstGeom prst="rect">
+            <a:avLst/>
+          </a:prstGeom>
+          <a:noFill/>
+        </p:spPr>
+        <p:txBody>
+          <a:bodyPr wrap="none" rtlCol="0">
+            <a:spAutoFit/>
+          </a:bodyPr>
+          <a:lstStyle/>
+          <a:p>
+            <a:r>
+              <a:rPr lang="vi-VN" sz="5400" dirty="0">
+                <a:ln w="19050">
+                  <a:solidFill>
+                    <a:schemeClr val="tx1"/>
+                  </a:solidFill>
+                </a:ln>
+                <a:solidFill>
+                  <a:srgbClr val="FFFF00"/>
+                </a:solidFill>
+                <a:latin typeface="FVF Fernando 08" panose="02000507020000020003" pitchFamily="2" charset="0"/>
+              </a:rPr>
+              <a:t>!   ~   ^   §</a:t>
+            </a:r>
+            <a:endParaRPr lang="en-US" sz="5400" dirty="0">
+              <a:ln w="19050">
+                <a:solidFill>
+                  <a:schemeClr val="tx1"/>
+                </a:solidFill>
+              </a:ln>
+              <a:solidFill>
+                <a:srgbClr val="FFFF00"/>
+              </a:solidFill>
+              <a:latin typeface="FVF Fernando 08" panose="02000507020000020003" pitchFamily="2" charset="0"/>
+            </a:endParaRPr>
+          </a:p>
+        </p:txBody>
+      </p:sp>
+    </p:spTree>
+    <p:extLst>
+      <p:ext uri="{BB962C8B-B14F-4D97-AF65-F5344CB8AC3E}">
+        <p14:creationId xmlns:p14="http://schemas.microsoft.com/office/powerpoint/2010/main" val="3844540494"/>
+      </p:ext>
+    </p:extLst>
+  </p:cSld>
+  <p:clrMapOvr>
+    <a:masterClrMapping/>
+  </p:clrMapOvr>
+</p:sld>
+</file>
+
+<file path=ppt/slides/slide93.xml><?xml version="1.0" encoding="utf-8"?>
+<p:sld xmlns:a="http://schemas.openxmlformats.org/drawingml/2006/main" xmlns:r="http://schemas.openxmlformats.org/officeDocument/2006/relationships" xmlns:p="http://schemas.openxmlformats.org/presentationml/2006/main">
+  <p:cSld>
+    <p:spTree>
+      <p:nvGrpSpPr>
+        <p:cNvPr id="1" name=""/>
+        <p:cNvGrpSpPr/>
+        <p:nvPr/>
+      </p:nvGrpSpPr>
+      <p:grpSpPr>
+        <a:xfrm>
+          <a:off x="0" y="0"/>
+          <a:ext cx="0" cy="0"/>
+          <a:chOff x="0" y="0"/>
+          <a:chExt cx="0" cy="0"/>
+        </a:xfrm>
+      </p:grpSpPr>
+      <p:sp>
+        <p:nvSpPr>
+          <p:cNvPr id="11" name="TextBox 10">
+            <a:extLst>
+              <a:ext uri="{FF2B5EF4-FFF2-40B4-BE49-F238E27FC236}">
+                <a16:creationId xmlns:a16="http://schemas.microsoft.com/office/drawing/2014/main" id="{49A7B9B6-8455-43BE-8670-E01CE03933DF}"/>
+              </a:ext>
+            </a:extLst>
+          </p:cNvPr>
+          <p:cNvSpPr txBox="1"/>
+          <p:nvPr/>
+        </p:nvSpPr>
+        <p:spPr>
+          <a:xfrm>
             <a:off x="267047" y="4149490"/>
             <a:ext cx="8667757" cy="923330"/>
           </a:xfrm>
@@ -45393,7 +45818,7 @@
 </p:sld>
 </file>
 
-<file path=ppt/slides/slide93.xml><?xml version="1.0" encoding="utf-8"?>
+<file path=ppt/slides/slide94.xml><?xml version="1.0" encoding="utf-8"?>
 <p:sld xmlns:a="http://schemas.openxmlformats.org/drawingml/2006/main" xmlns:r="http://schemas.openxmlformats.org/officeDocument/2006/relationships" xmlns:p="http://schemas.openxmlformats.org/presentationml/2006/main">
   <p:cSld>
     <p:spTree>
@@ -45663,7 +46088,7 @@
 </p:sld>
 </file>
 
-<file path=ppt/slides/slide94.xml><?xml version="1.0" encoding="utf-8"?>
+<file path=ppt/slides/slide95.xml><?xml version="1.0" encoding="utf-8"?>
 <p:sld xmlns:a="http://schemas.openxmlformats.org/drawingml/2006/main" xmlns:r="http://schemas.openxmlformats.org/officeDocument/2006/relationships" xmlns:p="http://schemas.openxmlformats.org/presentationml/2006/main">
   <p:cSld>
     <p:spTree>
@@ -45694,8 +46119,8 @@
         </p:nvSpPr>
         <p:spPr>
           <a:xfrm>
-            <a:off x="1353810" y="3961026"/>
-            <a:ext cx="6436377" cy="1015663"/>
+            <a:off x="3527483" y="4016867"/>
+            <a:ext cx="2089033" cy="923330"/>
           </a:xfrm>
           <a:prstGeom prst="rect">
             <a:avLst/>
@@ -45709,7 +46134,7 @@
           <a:lstStyle/>
           <a:p>
             <a:r>
-              <a:rPr lang="vi-VN" sz="6000" dirty="0">
+              <a:rPr lang="vi-VN" sz="5400">
                 <a:ln w="19050">
                   <a:solidFill>
                     <a:schemeClr val="tx1"/>
@@ -45720,9 +46145,9 @@
                 </a:solidFill>
                 <a:latin typeface="FVF Fernando 08" panose="02000507020000020003" pitchFamily="2" charset="0"/>
               </a:rPr>
-              <a:t>Toán tử kí tự</a:t>
+              <a:t>NPC</a:t>
             </a:r>
-            <a:endParaRPr lang="en-US" sz="6000" dirty="0">
+            <a:endParaRPr lang="en-US" sz="5400" dirty="0">
               <a:ln w="19050">
                 <a:solidFill>
                   <a:schemeClr val="tx1"/>
@@ -45779,66 +46204,46 @@
           </a:effectLst>
         </p:spPr>
       </p:pic>
-      <p:sp>
-        <p:nvSpPr>
-          <p:cNvPr id="7" name="TextBox 6">
+      <p:pic>
+        <p:nvPicPr>
+          <p:cNvPr id="3" name="Picture 2">
             <a:extLst>
               <a:ext uri="{FF2B5EF4-FFF2-40B4-BE49-F238E27FC236}">
-                <a16:creationId xmlns:a16="http://schemas.microsoft.com/office/drawing/2014/main" id="{C11996F8-5179-4D29-B915-8A8107AC8A3F}"/>
+                <a16:creationId xmlns:a16="http://schemas.microsoft.com/office/drawing/2014/main" id="{D3B27F49-B261-D44D-F0B4-FC06C91BF72C}"/>
               </a:ext>
             </a:extLst>
           </p:cNvPr>
-          <p:cNvSpPr txBox="1"/>
+          <p:cNvPicPr>
+            <a:picLocks noChangeAspect="1"/>
+          </p:cNvPicPr>
           <p:nvPr/>
-        </p:nvSpPr>
+        </p:nvPicPr>
+        <p:blipFill>
+          <a:blip r:embed="rId4">
+            <a:extLst>
+              <a:ext uri="{28A0092B-C50C-407E-A947-70E740481C1C}">
+                <a14:useLocalDpi xmlns:a14="http://schemas.microsoft.com/office/drawing/2010/main" val="0"/>
+              </a:ext>
+            </a:extLst>
+          </a:blip>
+          <a:stretch>
+            <a:fillRect/>
+          </a:stretch>
+        </p:blipFill>
         <p:spPr>
           <a:xfrm>
-            <a:off x="2445454" y="2110085"/>
-            <a:ext cx="4253087" cy="923330"/>
+            <a:off x="2104516" y="760191"/>
+            <a:ext cx="4934967" cy="2775919"/>
           </a:xfrm>
           <a:prstGeom prst="rect">
             <a:avLst/>
           </a:prstGeom>
-          <a:noFill/>
         </p:spPr>
-        <p:txBody>
-          <a:bodyPr wrap="none" rtlCol="0">
-            <a:spAutoFit/>
-          </a:bodyPr>
-          <a:lstStyle/>
-          <a:p>
-            <a:r>
-              <a:rPr lang="vi-VN" sz="5400" dirty="0">
-                <a:ln w="19050">
-                  <a:solidFill>
-                    <a:schemeClr val="tx1"/>
-                  </a:solidFill>
-                </a:ln>
-                <a:solidFill>
-                  <a:srgbClr val="FFFF00"/>
-                </a:solidFill>
-                <a:latin typeface="FVF Fernando 08" panose="02000507020000020003" pitchFamily="2" charset="0"/>
-              </a:rPr>
-              <a:t>!   ~   ^   §</a:t>
-            </a:r>
-            <a:endParaRPr lang="en-US" sz="5400" dirty="0">
-              <a:ln w="19050">
-                <a:solidFill>
-                  <a:schemeClr val="tx1"/>
-                </a:solidFill>
-              </a:ln>
-              <a:solidFill>
-                <a:srgbClr val="FFFF00"/>
-              </a:solidFill>
-              <a:latin typeface="FVF Fernando 08" panose="02000507020000020003" pitchFamily="2" charset="0"/>
-            </a:endParaRPr>
-          </a:p>
-        </p:txBody>
-      </p:sp>
+      </p:pic>
     </p:spTree>
     <p:extLst>
       <p:ext uri="{BB962C8B-B14F-4D97-AF65-F5344CB8AC3E}">
-        <p14:creationId xmlns:p14="http://schemas.microsoft.com/office/powerpoint/2010/main" val="3844540494"/>
+        <p14:creationId xmlns:p14="http://schemas.microsoft.com/office/powerpoint/2010/main" val="3730852028"/>
       </p:ext>
     </p:extLst>
   </p:cSld>
@@ -45848,7 +46253,7 @@
 </p:sld>
 </file>
 
-<file path=ppt/slides/slide95.xml><?xml version="1.0" encoding="utf-8"?>
+<file path=ppt/slides/slide96.xml><?xml version="1.0" encoding="utf-8"?>
 <p:sld xmlns:a="http://schemas.openxmlformats.org/drawingml/2006/main" xmlns:r="http://schemas.openxmlformats.org/officeDocument/2006/relationships" xmlns:p="http://schemas.openxmlformats.org/presentationml/2006/main">
   <p:cSld>
     <p:spTree>
@@ -46033,7 +46438,7 @@
 </p:sld>
 </file>
 
-<file path=ppt/slides/slide96.xml><?xml version="1.0" encoding="utf-8"?>
+<file path=ppt/slides/slide97.xml><?xml version="1.0" encoding="utf-8"?>
 <p:sld xmlns:a="http://schemas.openxmlformats.org/drawingml/2006/main" xmlns:r="http://schemas.openxmlformats.org/officeDocument/2006/relationships" xmlns:p="http://schemas.openxmlformats.org/presentationml/2006/main">
   <p:cSld>
     <p:spTree>
@@ -46198,7 +46603,7 @@
 </p:sld>
 </file>
 
-<file path=ppt/slides/slide97.xml><?xml version="1.0" encoding="utf-8"?>
+<file path=ppt/slides/slide98.xml><?xml version="1.0" encoding="utf-8"?>
 <p:sld xmlns:a="http://schemas.openxmlformats.org/drawingml/2006/main" xmlns:r="http://schemas.openxmlformats.org/officeDocument/2006/relationships" xmlns:p="http://schemas.openxmlformats.org/presentationml/2006/main">
   <p:cSld>
     <p:spTree>
@@ -46437,7 +46842,7 @@
 </p:sld>
 </file>
 
-<file path=ppt/slides/slide98.xml><?xml version="1.0" encoding="utf-8"?>
+<file path=ppt/slides/slide99.xml><?xml version="1.0" encoding="utf-8"?>
 <p:sld xmlns:a="http://schemas.openxmlformats.org/drawingml/2006/main" xmlns:r="http://schemas.openxmlformats.org/officeDocument/2006/relationships" xmlns:p="http://schemas.openxmlformats.org/presentationml/2006/main">
   <p:cSld>
     <p:spTree>
@@ -46640,160 +47045,6 @@
     <p:extLst>
       <p:ext uri="{BB962C8B-B14F-4D97-AF65-F5344CB8AC3E}">
         <p14:creationId xmlns:p14="http://schemas.microsoft.com/office/powerpoint/2010/main" val="3123073807"/>
-      </p:ext>
-    </p:extLst>
-  </p:cSld>
-  <p:clrMapOvr>
-    <a:masterClrMapping/>
-  </p:clrMapOvr>
-</p:sld>
-</file>
-
-<file path=ppt/slides/slide99.xml><?xml version="1.0" encoding="utf-8"?>
-<p:sld xmlns:a="http://schemas.openxmlformats.org/drawingml/2006/main" xmlns:r="http://schemas.openxmlformats.org/officeDocument/2006/relationships" xmlns:p="http://schemas.openxmlformats.org/presentationml/2006/main">
-  <p:cSld>
-    <p:spTree>
-      <p:nvGrpSpPr>
-        <p:cNvPr id="1" name=""/>
-        <p:cNvGrpSpPr/>
-        <p:nvPr/>
-      </p:nvGrpSpPr>
-      <p:grpSpPr>
-        <a:xfrm>
-          <a:off x="0" y="0"/>
-          <a:ext cx="0" cy="0"/>
-          <a:chOff x="0" y="0"/>
-          <a:chExt cx="0" cy="0"/>
-        </a:xfrm>
-      </p:grpSpPr>
-      <p:sp>
-        <p:nvSpPr>
-          <p:cNvPr id="11" name="TextBox 10">
-            <a:extLst>
-              <a:ext uri="{FF2B5EF4-FFF2-40B4-BE49-F238E27FC236}">
-                <a16:creationId xmlns:a16="http://schemas.microsoft.com/office/drawing/2014/main" id="{49A7B9B6-8455-43BE-8670-E01CE03933DF}"/>
-              </a:ext>
-            </a:extLst>
-          </p:cNvPr>
-          <p:cNvSpPr txBox="1"/>
-          <p:nvPr/>
-        </p:nvSpPr>
-        <p:spPr>
-          <a:xfrm>
-            <a:off x="1834712" y="3858413"/>
-            <a:ext cx="5474576" cy="1015663"/>
-          </a:xfrm>
-          <a:prstGeom prst="rect">
-            <a:avLst/>
-          </a:prstGeom>
-          <a:noFill/>
-        </p:spPr>
-        <p:txBody>
-          <a:bodyPr wrap="none" rtlCol="0">
-            <a:spAutoFit/>
-          </a:bodyPr>
-          <a:lstStyle/>
-          <a:p>
-            <a:r>
-              <a:rPr lang="en-US" sz="6000" dirty="0">
-                <a:ln w="19050">
-                  <a:solidFill>
-                    <a:schemeClr val="tx1"/>
-                  </a:solidFill>
-                </a:ln>
-                <a:solidFill>
-                  <a:srgbClr val="FFFF00"/>
-                </a:solidFill>
-                <a:latin typeface="FVF Fernando 08" panose="02000507020000020003" pitchFamily="2" charset="0"/>
-              </a:rPr>
-              <a:t>Easter Egg</a:t>
-            </a:r>
-          </a:p>
-        </p:txBody>
-      </p:sp>
-      <p:pic>
-        <p:nvPicPr>
-          <p:cNvPr id="14" name="Picture 13">
-            <a:extLst>
-              <a:ext uri="{FF2B5EF4-FFF2-40B4-BE49-F238E27FC236}">
-                <a16:creationId xmlns:a16="http://schemas.microsoft.com/office/drawing/2014/main" id="{E2D411D6-C028-4F7B-96FB-CC2855017620}"/>
-              </a:ext>
-            </a:extLst>
-          </p:cNvPr>
-          <p:cNvPicPr>
-            <a:picLocks noChangeAspect="1"/>
-          </p:cNvPicPr>
-          <p:nvPr/>
-        </p:nvPicPr>
-        <p:blipFill>
-          <a:blip r:embed="rId3">
-            <a:extLst>
-              <a:ext uri="{28A0092B-C50C-407E-A947-70E740481C1C}">
-                <a14:useLocalDpi xmlns:a14="http://schemas.microsoft.com/office/drawing/2010/main" val="0"/>
-              </a:ext>
-            </a:extLst>
-          </a:blip>
-          <a:srcRect/>
-          <a:stretch/>
-        </p:blipFill>
-        <p:spPr>
-          <a:xfrm>
-            <a:off x="7675990" y="30481"/>
-            <a:ext cx="1490870" cy="1490870"/>
-          </a:xfrm>
-          <a:prstGeom prst="rect">
-            <a:avLst/>
-          </a:prstGeom>
-          <a:ln w="19050">
-            <a:noFill/>
-          </a:ln>
-          <a:effectLst>
-            <a:outerShdw blurRad="63500" sx="104000" sy="104000" algn="ctr" rotWithShape="0">
-              <a:srgbClr val="FFFF00"/>
-            </a:outerShdw>
-          </a:effectLst>
-        </p:spPr>
-      </p:pic>
-      <p:pic>
-        <p:nvPicPr>
-          <p:cNvPr id="4" name="Picture 3">
-            <a:extLst>
-              <a:ext uri="{FF2B5EF4-FFF2-40B4-BE49-F238E27FC236}">
-                <a16:creationId xmlns:a16="http://schemas.microsoft.com/office/drawing/2014/main" id="{62FA9332-BDFE-41E2-9F3F-7000995C0D5E}"/>
-              </a:ext>
-            </a:extLst>
-          </p:cNvPr>
-          <p:cNvPicPr>
-            <a:picLocks noChangeAspect="1"/>
-          </p:cNvPicPr>
-          <p:nvPr/>
-        </p:nvPicPr>
-        <p:blipFill>
-          <a:blip r:embed="rId4">
-            <a:extLst>
-              <a:ext uri="{28A0092B-C50C-407E-A947-70E740481C1C}">
-                <a14:useLocalDpi xmlns:a14="http://schemas.microsoft.com/office/drawing/2010/main" val="0"/>
-              </a:ext>
-            </a:extLst>
-          </a:blip>
-          <a:stretch>
-            <a:fillRect/>
-          </a:stretch>
-        </p:blipFill>
-        <p:spPr>
-          <a:xfrm>
-            <a:off x="3157937" y="775916"/>
-            <a:ext cx="2828125" cy="2828125"/>
-          </a:xfrm>
-          <a:prstGeom prst="rect">
-            <a:avLst/>
-          </a:prstGeom>
-        </p:spPr>
-      </p:pic>
-    </p:spTree>
-    <p:extLst>
-      <p:ext uri="{BB962C8B-B14F-4D97-AF65-F5344CB8AC3E}">
-        <p14:creationId xmlns:p14="http://schemas.microsoft.com/office/powerpoint/2010/main" val="312882953"/>
       </p:ext>
     </p:extLst>
   </p:cSld>

</xml_diff>